<commit_message>
replaced url with shortenURL
</commit_message>
<xml_diff>
--- a/ppt/install_apps_2_flame.pptx
+++ b/ppt/install_apps_2_flame.pptx
@@ -5175,8 +5175,8 @@
               <a:buNone/>
             </a:pPr>
             <a:r>
-              <a:rPr lang="en-US" altLang="ja-JP" sz="2400" dirty="0"/>
-              <a:t>https://ftp.mozilla.org/pub/mozilla.org/labs/fxos-simulator/</a:t>
+              <a:rPr lang="en-US" altLang="ja-JP" dirty="0"/>
+              <a:t>http://goo.gl/6ck2n7</a:t>
             </a:r>
             <a:endParaRPr kumimoji="1" lang="ja-JP" altLang="en-US" sz="2400" dirty="0"/>
           </a:p>

</xml_diff>